<commit_message>
Added tutorial for using ZarrDatasetIO
</commit_message>
<xml_diff>
--- a/docs/source/figures/gallery_thumbnails.pptx
+++ b/docs/source/figures/gallery_thumbnails.pptx
@@ -5,11 +5,12 @@
     <p:sldMasterId id="2147483660" r:id="rId1"/>
   </p:sldMasterIdLst>
   <p:notesMasterIdLst>
-    <p:notesMasterId r:id="rId4"/>
+    <p:notesMasterId r:id="rId5"/>
   </p:notesMasterIdLst>
   <p:sldIdLst>
     <p:sldId id="345" r:id="rId2"/>
     <p:sldId id="346" r:id="rId3"/>
+    <p:sldId id="357" r:id="rId4"/>
   </p:sldIdLst>
   <p:sldSz cx="12192000" cy="6858000"/>
   <p:notesSz cx="6858000" cy="9144000"/>
@@ -209,7 +210,7 @@
           <a:p>
             <a:fld id="{4D6A40B9-902A-4E0E-AF39-1C357549AEE0}" type="datetimeFigureOut">
               <a:rPr lang="en-US" smtClean="0"/>
-              <a:t>4/14/22</a:t>
+              <a:t>4/15/22</a:t>
             </a:fld>
             <a:endParaRPr lang="en-US"/>
           </a:p>
@@ -3782,6 +3783,634 @@
     <p:extLst>
       <p:ext uri="{BB962C8B-B14F-4D97-AF65-F5344CB8AC3E}">
         <p14:creationId xmlns:p14="http://schemas.microsoft.com/office/powerpoint/2010/main" val="2028573429"/>
+      </p:ext>
+    </p:extLst>
+  </p:cSld>
+  <p:clrMapOvr>
+    <a:masterClrMapping/>
+  </p:clrMapOvr>
+</p:sld>
+</file>
+
+<file path=ppt/slides/slide3.xml><?xml version="1.0" encoding="utf-8"?>
+<p:sld xmlns:a="http://schemas.openxmlformats.org/drawingml/2006/main" xmlns:r="http://schemas.openxmlformats.org/officeDocument/2006/relationships" xmlns:p="http://schemas.openxmlformats.org/presentationml/2006/main">
+  <p:cSld>
+    <p:spTree>
+      <p:nvGrpSpPr>
+        <p:cNvPr id="1" name=""/>
+        <p:cNvGrpSpPr/>
+        <p:nvPr/>
+      </p:nvGrpSpPr>
+      <p:grpSpPr>
+        <a:xfrm>
+          <a:off x="0" y="0"/>
+          <a:ext cx="0" cy="0"/>
+          <a:chOff x="0" y="0"/>
+          <a:chExt cx="0" cy="0"/>
+        </a:xfrm>
+      </p:grpSpPr>
+      <p:sp>
+        <p:nvSpPr>
+          <p:cNvPr id="27" name="Rounded Rectangle 26"/>
+          <p:cNvSpPr/>
+          <p:nvPr/>
+        </p:nvSpPr>
+        <p:spPr>
+          <a:xfrm>
+            <a:off x="853570" y="853671"/>
+            <a:ext cx="7234527" cy="4851352"/>
+          </a:xfrm>
+          <a:prstGeom prst="roundRect">
+            <a:avLst>
+              <a:gd name="adj" fmla="val 4437"/>
+            </a:avLst>
+          </a:prstGeom>
+          <a:solidFill>
+            <a:srgbClr val="EDEDED"/>
+          </a:solidFill>
+          <a:ln>
+            <a:solidFill>
+              <a:srgbClr val="000000"/>
+            </a:solidFill>
+          </a:ln>
+          <a:effectLst/>
+        </p:spPr>
+        <p:style>
+          <a:lnRef idx="1">
+            <a:schemeClr val="accent1"/>
+          </a:lnRef>
+          <a:fillRef idx="3">
+            <a:schemeClr val="accent1"/>
+          </a:fillRef>
+          <a:effectRef idx="2">
+            <a:schemeClr val="accent1"/>
+          </a:effectRef>
+          <a:fontRef idx="minor">
+            <a:schemeClr val="lt1"/>
+          </a:fontRef>
+        </p:style>
+        <p:txBody>
+          <a:bodyPr rtlCol="0" anchor="ctr"/>
+          <a:lstStyle/>
+          <a:p>
+            <a:pPr algn="ctr"/>
+            <a:endParaRPr lang="en-US"/>
+          </a:p>
+        </p:txBody>
+      </p:sp>
+      <p:sp>
+        <p:nvSpPr>
+          <p:cNvPr id="26" name="Rectangle 25"/>
+          <p:cNvSpPr/>
+          <p:nvPr/>
+        </p:nvSpPr>
+        <p:spPr>
+          <a:xfrm>
+            <a:off x="863980" y="855015"/>
+            <a:ext cx="7213708" cy="923330"/>
+          </a:xfrm>
+          <a:prstGeom prst="rect">
+            <a:avLst/>
+          </a:prstGeom>
+        </p:spPr>
+        <p:txBody>
+          <a:bodyPr wrap="square">
+            <a:spAutoFit/>
+          </a:bodyPr>
+          <a:lstStyle/>
+          <a:p>
+            <a:pPr algn="ctr"/>
+            <a:r>
+              <a:rPr lang="en-US" sz="5400" b="1" dirty="0" err="1">
+                <a:solidFill>
+                  <a:srgbClr val="052B48"/>
+                </a:solidFill>
+                <a:latin typeface="Calibri"/>
+                <a:cs typeface="Calibri"/>
+              </a:rPr>
+              <a:t>Zarr</a:t>
+            </a:r>
+            <a:r>
+              <a:rPr lang="en-US" sz="5400" b="1" dirty="0">
+                <a:solidFill>
+                  <a:srgbClr val="052B48"/>
+                </a:solidFill>
+                <a:latin typeface="Calibri"/>
+                <a:cs typeface="Calibri"/>
+              </a:rPr>
+              <a:t> Dataset I/O</a:t>
+            </a:r>
+          </a:p>
+        </p:txBody>
+      </p:sp>
+      <p:sp>
+        <p:nvSpPr>
+          <p:cNvPr id="20" name="Cube 19"/>
+          <p:cNvSpPr/>
+          <p:nvPr/>
+        </p:nvSpPr>
+        <p:spPr>
+          <a:xfrm>
+            <a:off x="2828954" y="3371304"/>
+            <a:ext cx="1901188" cy="1633887"/>
+          </a:xfrm>
+          <a:prstGeom prst="cube">
+            <a:avLst/>
+          </a:prstGeom>
+          <a:solidFill>
+            <a:srgbClr val="052A48"/>
+          </a:solidFill>
+          <a:ln w="28575" cap="flat" cmpd="sng" algn="ctr">
+            <a:solidFill>
+              <a:srgbClr val="FFFFFF"/>
+            </a:solidFill>
+            <a:prstDash val="solid"/>
+          </a:ln>
+          <a:effectLst/>
+        </p:spPr>
+        <p:txBody>
+          <a:bodyPr rtlCol="0" anchor="ctr"/>
+          <a:lstStyle/>
+          <a:p>
+            <a:pPr marL="0" marR="0" lvl="0" indent="0" algn="ctr" defTabSz="914400" eaLnBrk="1" fontAlgn="auto" latinLnBrk="0" hangingPunct="1">
+              <a:lnSpc>
+                <a:spcPct val="100000"/>
+              </a:lnSpc>
+              <a:spcBef>
+                <a:spcPts val="0"/>
+              </a:spcBef>
+              <a:spcAft>
+                <a:spcPts val="0"/>
+              </a:spcAft>
+              <a:buClrTx/>
+              <a:buSzTx/>
+              <a:buFontTx/>
+              <a:buNone/>
+              <a:tabLst/>
+              <a:defRPr/>
+            </a:pPr>
+            <a:endParaRPr kumimoji="0" lang="en-US" sz="1800" b="0" i="0" u="none" strike="noStrike" kern="0" cap="none" spc="0" normalizeH="0" baseline="0" noProof="0">
+              <a:ln>
+                <a:noFill/>
+              </a:ln>
+              <a:solidFill>
+                <a:sysClr val="window" lastClr="FFFFFF"/>
+              </a:solidFill>
+              <a:effectLst/>
+              <a:uLnTx/>
+              <a:uFillTx/>
+              <a:latin typeface="Calibri"/>
+              <a:ea typeface="+mn-ea"/>
+              <a:cs typeface="+mn-cs"/>
+            </a:endParaRPr>
+          </a:p>
+        </p:txBody>
+      </p:sp>
+      <p:sp>
+        <p:nvSpPr>
+          <p:cNvPr id="21" name="Cube 20"/>
+          <p:cNvSpPr/>
+          <p:nvPr/>
+        </p:nvSpPr>
+        <p:spPr>
+          <a:xfrm>
+            <a:off x="4414903" y="3371304"/>
+            <a:ext cx="1901188" cy="1633887"/>
+          </a:xfrm>
+          <a:prstGeom prst="cube">
+            <a:avLst/>
+          </a:prstGeom>
+          <a:solidFill>
+            <a:srgbClr val="E11271"/>
+          </a:solidFill>
+          <a:ln w="28575" cap="flat" cmpd="sng" algn="ctr">
+            <a:solidFill>
+              <a:srgbClr val="FFFFFF"/>
+            </a:solidFill>
+            <a:prstDash val="solid"/>
+          </a:ln>
+          <a:effectLst/>
+        </p:spPr>
+        <p:txBody>
+          <a:bodyPr rtlCol="0" anchor="ctr"/>
+          <a:lstStyle/>
+          <a:p>
+            <a:pPr marL="0" marR="0" lvl="0" indent="0" algn="ctr" defTabSz="914400" eaLnBrk="1" fontAlgn="auto" latinLnBrk="0" hangingPunct="1">
+              <a:lnSpc>
+                <a:spcPct val="100000"/>
+              </a:lnSpc>
+              <a:spcBef>
+                <a:spcPts val="0"/>
+              </a:spcBef>
+              <a:spcAft>
+                <a:spcPts val="0"/>
+              </a:spcAft>
+              <a:buClrTx/>
+              <a:buSzTx/>
+              <a:buFontTx/>
+              <a:buNone/>
+              <a:tabLst/>
+              <a:defRPr/>
+            </a:pPr>
+            <a:endParaRPr kumimoji="0" lang="en-US" sz="1800" b="0" i="0" u="none" strike="noStrike" kern="0" cap="none" spc="0" normalizeH="0" baseline="0" noProof="0">
+              <a:ln>
+                <a:noFill/>
+              </a:ln>
+              <a:solidFill>
+                <a:sysClr val="window" lastClr="FFFFFF"/>
+              </a:solidFill>
+              <a:effectLst/>
+              <a:uLnTx/>
+              <a:uFillTx/>
+              <a:latin typeface="Calibri"/>
+              <a:ea typeface="+mn-ea"/>
+              <a:cs typeface="+mn-cs"/>
+            </a:endParaRPr>
+          </a:p>
+        </p:txBody>
+      </p:sp>
+      <p:sp>
+        <p:nvSpPr>
+          <p:cNvPr id="22" name="Cube 21"/>
+          <p:cNvSpPr/>
+          <p:nvPr/>
+        </p:nvSpPr>
+        <p:spPr>
+          <a:xfrm>
+            <a:off x="2828954" y="2080151"/>
+            <a:ext cx="1901188" cy="1633887"/>
+          </a:xfrm>
+          <a:prstGeom prst="cube">
+            <a:avLst/>
+          </a:prstGeom>
+          <a:solidFill>
+            <a:srgbClr val="E11271"/>
+          </a:solidFill>
+          <a:ln w="28575" cap="flat" cmpd="sng" algn="ctr">
+            <a:solidFill>
+              <a:srgbClr val="FFFFFF"/>
+            </a:solidFill>
+            <a:prstDash val="solid"/>
+          </a:ln>
+          <a:effectLst/>
+        </p:spPr>
+        <p:txBody>
+          <a:bodyPr rtlCol="0" anchor="ctr"/>
+          <a:lstStyle/>
+          <a:p>
+            <a:pPr marL="0" marR="0" lvl="0" indent="0" algn="ctr" defTabSz="914400" eaLnBrk="1" fontAlgn="auto" latinLnBrk="0" hangingPunct="1">
+              <a:lnSpc>
+                <a:spcPct val="100000"/>
+              </a:lnSpc>
+              <a:spcBef>
+                <a:spcPts val="0"/>
+              </a:spcBef>
+              <a:spcAft>
+                <a:spcPts val="0"/>
+              </a:spcAft>
+              <a:buClrTx/>
+              <a:buSzTx/>
+              <a:buFontTx/>
+              <a:buNone/>
+              <a:tabLst/>
+              <a:defRPr/>
+            </a:pPr>
+            <a:endParaRPr kumimoji="0" lang="en-US" sz="1800" b="0" i="0" u="none" strike="noStrike" kern="0" cap="none" spc="0" normalizeH="0" baseline="0" noProof="0">
+              <a:ln>
+                <a:noFill/>
+              </a:ln>
+              <a:solidFill>
+                <a:sysClr val="window" lastClr="FFFFFF"/>
+              </a:solidFill>
+              <a:effectLst/>
+              <a:uLnTx/>
+              <a:uFillTx/>
+              <a:latin typeface="Calibri"/>
+              <a:ea typeface="+mn-ea"/>
+              <a:cs typeface="+mn-cs"/>
+            </a:endParaRPr>
+          </a:p>
+        </p:txBody>
+      </p:sp>
+      <p:sp>
+        <p:nvSpPr>
+          <p:cNvPr id="23" name="Cube 22"/>
+          <p:cNvSpPr/>
+          <p:nvPr/>
+        </p:nvSpPr>
+        <p:spPr>
+          <a:xfrm>
+            <a:off x="4414903" y="2080151"/>
+            <a:ext cx="1901188" cy="1633887"/>
+          </a:xfrm>
+          <a:prstGeom prst="cube">
+            <a:avLst/>
+          </a:prstGeom>
+          <a:solidFill>
+            <a:srgbClr val="E19CBC"/>
+          </a:solidFill>
+          <a:ln w="28575" cap="flat" cmpd="sng" algn="ctr">
+            <a:solidFill>
+              <a:srgbClr val="FFFFFF"/>
+            </a:solidFill>
+            <a:prstDash val="solid"/>
+          </a:ln>
+          <a:effectLst/>
+        </p:spPr>
+        <p:txBody>
+          <a:bodyPr rtlCol="0" anchor="ctr"/>
+          <a:lstStyle/>
+          <a:p>
+            <a:pPr marL="0" marR="0" lvl="0" indent="0" algn="ctr" defTabSz="914400" eaLnBrk="1" fontAlgn="auto" latinLnBrk="0" hangingPunct="1">
+              <a:lnSpc>
+                <a:spcPct val="100000"/>
+              </a:lnSpc>
+              <a:spcBef>
+                <a:spcPts val="0"/>
+              </a:spcBef>
+              <a:spcAft>
+                <a:spcPts val="0"/>
+              </a:spcAft>
+              <a:buClrTx/>
+              <a:buSzTx/>
+              <a:buFontTx/>
+              <a:buNone/>
+              <a:tabLst/>
+              <a:defRPr/>
+            </a:pPr>
+            <a:endParaRPr kumimoji="0" lang="en-US" sz="1800" b="0" i="0" u="none" strike="noStrike" kern="0" cap="none" spc="0" normalizeH="0" baseline="0" noProof="0">
+              <a:ln>
+                <a:noFill/>
+              </a:ln>
+              <a:solidFill>
+                <a:sysClr val="window" lastClr="FFFFFF"/>
+              </a:solidFill>
+              <a:effectLst/>
+              <a:uLnTx/>
+              <a:uFillTx/>
+              <a:latin typeface="Calibri"/>
+              <a:ea typeface="+mn-ea"/>
+              <a:cs typeface="+mn-cs"/>
+            </a:endParaRPr>
+          </a:p>
+        </p:txBody>
+      </p:sp>
+      <p:sp>
+        <p:nvSpPr>
+          <p:cNvPr id="24" name="Cube 23"/>
+          <p:cNvSpPr/>
+          <p:nvPr/>
+        </p:nvSpPr>
+        <p:spPr>
+          <a:xfrm>
+            <a:off x="2398343" y="3845513"/>
+            <a:ext cx="1901188" cy="1633887"/>
+          </a:xfrm>
+          <a:prstGeom prst="cube">
+            <a:avLst/>
+          </a:prstGeom>
+          <a:solidFill>
+            <a:srgbClr val="08436D"/>
+          </a:solidFill>
+          <a:ln w="28575" cap="flat" cmpd="sng" algn="ctr">
+            <a:solidFill>
+              <a:srgbClr val="FFFFFF"/>
+            </a:solidFill>
+            <a:prstDash val="solid"/>
+          </a:ln>
+          <a:effectLst/>
+        </p:spPr>
+        <p:txBody>
+          <a:bodyPr rtlCol="0" anchor="ctr"/>
+          <a:lstStyle/>
+          <a:p>
+            <a:pPr marL="0" marR="0" lvl="0" indent="0" algn="ctr" defTabSz="914400" eaLnBrk="1" fontAlgn="auto" latinLnBrk="0" hangingPunct="1">
+              <a:lnSpc>
+                <a:spcPct val="100000"/>
+              </a:lnSpc>
+              <a:spcBef>
+                <a:spcPts val="0"/>
+              </a:spcBef>
+              <a:spcAft>
+                <a:spcPts val="0"/>
+              </a:spcAft>
+              <a:buClrTx/>
+              <a:buSzTx/>
+              <a:buFontTx/>
+              <a:buNone/>
+              <a:tabLst/>
+              <a:defRPr/>
+            </a:pPr>
+            <a:endParaRPr kumimoji="0" lang="en-US" sz="1800" b="0" i="0" u="none" strike="noStrike" kern="0" cap="none" spc="0" normalizeH="0" baseline="0" noProof="0">
+              <a:ln>
+                <a:noFill/>
+              </a:ln>
+              <a:solidFill>
+                <a:sysClr val="window" lastClr="FFFFFF"/>
+              </a:solidFill>
+              <a:effectLst/>
+              <a:uLnTx/>
+              <a:uFillTx/>
+              <a:latin typeface="Calibri"/>
+              <a:ea typeface="+mn-ea"/>
+              <a:cs typeface="+mn-cs"/>
+            </a:endParaRPr>
+          </a:p>
+        </p:txBody>
+      </p:sp>
+      <p:sp>
+        <p:nvSpPr>
+          <p:cNvPr id="25" name="Cube 24"/>
+          <p:cNvSpPr/>
+          <p:nvPr/>
+        </p:nvSpPr>
+        <p:spPr>
+          <a:xfrm>
+            <a:off x="3984291" y="3845513"/>
+            <a:ext cx="1901188" cy="1633887"/>
+          </a:xfrm>
+          <a:prstGeom prst="cube">
+            <a:avLst/>
+          </a:prstGeom>
+          <a:solidFill>
+            <a:srgbClr val="052A48"/>
+          </a:solidFill>
+          <a:ln w="28575" cap="flat" cmpd="sng" algn="ctr">
+            <a:solidFill>
+              <a:srgbClr val="FFFFFF"/>
+            </a:solidFill>
+            <a:prstDash val="solid"/>
+          </a:ln>
+          <a:effectLst/>
+        </p:spPr>
+        <p:txBody>
+          <a:bodyPr rtlCol="0" anchor="ctr"/>
+          <a:lstStyle/>
+          <a:p>
+            <a:pPr marL="0" marR="0" lvl="0" indent="0" algn="ctr" defTabSz="914400" eaLnBrk="1" fontAlgn="auto" latinLnBrk="0" hangingPunct="1">
+              <a:lnSpc>
+                <a:spcPct val="100000"/>
+              </a:lnSpc>
+              <a:spcBef>
+                <a:spcPts val="0"/>
+              </a:spcBef>
+              <a:spcAft>
+                <a:spcPts val="0"/>
+              </a:spcAft>
+              <a:buClrTx/>
+              <a:buSzTx/>
+              <a:buFontTx/>
+              <a:buNone/>
+              <a:tabLst/>
+              <a:defRPr/>
+            </a:pPr>
+            <a:endParaRPr kumimoji="0" lang="en-US" sz="1800" b="0" i="0" u="none" strike="noStrike" kern="0" cap="none" spc="0" normalizeH="0" baseline="0" noProof="0">
+              <a:ln>
+                <a:noFill/>
+              </a:ln>
+              <a:solidFill>
+                <a:sysClr val="window" lastClr="FFFFFF"/>
+              </a:solidFill>
+              <a:effectLst/>
+              <a:uLnTx/>
+              <a:uFillTx/>
+              <a:latin typeface="Calibri"/>
+              <a:ea typeface="+mn-ea"/>
+              <a:cs typeface="+mn-cs"/>
+            </a:endParaRPr>
+          </a:p>
+        </p:txBody>
+      </p:sp>
+      <p:sp>
+        <p:nvSpPr>
+          <p:cNvPr id="28" name="Cube 27"/>
+          <p:cNvSpPr/>
+          <p:nvPr/>
+        </p:nvSpPr>
+        <p:spPr>
+          <a:xfrm>
+            <a:off x="2398343" y="2554360"/>
+            <a:ext cx="1901188" cy="1633887"/>
+          </a:xfrm>
+          <a:prstGeom prst="cube">
+            <a:avLst/>
+          </a:prstGeom>
+          <a:solidFill>
+            <a:srgbClr val="3088CE"/>
+          </a:solidFill>
+          <a:ln w="28575" cap="flat" cmpd="sng" algn="ctr">
+            <a:solidFill>
+              <a:srgbClr val="FFFFFF"/>
+            </a:solidFill>
+            <a:prstDash val="solid"/>
+          </a:ln>
+          <a:effectLst/>
+        </p:spPr>
+        <p:txBody>
+          <a:bodyPr rtlCol="0" anchor="ctr"/>
+          <a:lstStyle/>
+          <a:p>
+            <a:pPr marL="0" marR="0" lvl="0" indent="0" algn="ctr" defTabSz="914400" eaLnBrk="1" fontAlgn="auto" latinLnBrk="0" hangingPunct="1">
+              <a:lnSpc>
+                <a:spcPct val="100000"/>
+              </a:lnSpc>
+              <a:spcBef>
+                <a:spcPts val="0"/>
+              </a:spcBef>
+              <a:spcAft>
+                <a:spcPts val="0"/>
+              </a:spcAft>
+              <a:buClrTx/>
+              <a:buSzTx/>
+              <a:buFontTx/>
+              <a:buNone/>
+              <a:tabLst/>
+              <a:defRPr/>
+            </a:pPr>
+            <a:endParaRPr kumimoji="0" lang="en-US" sz="1800" b="0" i="0" u="none" strike="noStrike" kern="0" cap="none" spc="0" normalizeH="0" baseline="0" noProof="0">
+              <a:ln>
+                <a:noFill/>
+              </a:ln>
+              <a:solidFill>
+                <a:sysClr val="window" lastClr="FFFFFF"/>
+              </a:solidFill>
+              <a:effectLst/>
+              <a:uLnTx/>
+              <a:uFillTx/>
+              <a:latin typeface="Calibri"/>
+              <a:ea typeface="+mn-ea"/>
+              <a:cs typeface="+mn-cs"/>
+            </a:endParaRPr>
+          </a:p>
+        </p:txBody>
+      </p:sp>
+      <p:sp>
+        <p:nvSpPr>
+          <p:cNvPr id="29" name="Cube 28"/>
+          <p:cNvSpPr/>
+          <p:nvPr/>
+        </p:nvSpPr>
+        <p:spPr>
+          <a:xfrm>
+            <a:off x="3984291" y="2554360"/>
+            <a:ext cx="1901188" cy="1633887"/>
+          </a:xfrm>
+          <a:prstGeom prst="cube">
+            <a:avLst/>
+          </a:prstGeom>
+          <a:solidFill>
+            <a:srgbClr val="C0E3FF"/>
+          </a:solidFill>
+          <a:ln w="28575" cap="flat" cmpd="sng" algn="ctr">
+            <a:solidFill>
+              <a:srgbClr val="FFFFFF"/>
+            </a:solidFill>
+            <a:prstDash val="solid"/>
+          </a:ln>
+          <a:effectLst/>
+        </p:spPr>
+        <p:txBody>
+          <a:bodyPr rtlCol="0" anchor="ctr"/>
+          <a:lstStyle/>
+          <a:p>
+            <a:pPr marL="0" marR="0" lvl="0" indent="0" algn="ctr" defTabSz="914400" eaLnBrk="1" fontAlgn="auto" latinLnBrk="0" hangingPunct="1">
+              <a:lnSpc>
+                <a:spcPct val="100000"/>
+              </a:lnSpc>
+              <a:spcBef>
+                <a:spcPts val="0"/>
+              </a:spcBef>
+              <a:spcAft>
+                <a:spcPts val="0"/>
+              </a:spcAft>
+              <a:buClrTx/>
+              <a:buSzTx/>
+              <a:buFontTx/>
+              <a:buNone/>
+              <a:tabLst/>
+              <a:defRPr/>
+            </a:pPr>
+            <a:endParaRPr kumimoji="0" lang="en-US" sz="1800" b="0" i="0" u="none" strike="noStrike" kern="0" cap="none" spc="0" normalizeH="0" baseline="0" noProof="0">
+              <a:ln>
+                <a:noFill/>
+              </a:ln>
+              <a:solidFill>
+                <a:sysClr val="window" lastClr="FFFFFF"/>
+              </a:solidFill>
+              <a:effectLst/>
+              <a:uLnTx/>
+              <a:uFillTx/>
+              <a:latin typeface="Calibri"/>
+              <a:ea typeface="+mn-ea"/>
+              <a:cs typeface="+mn-cs"/>
+            </a:endParaRPr>
+          </a:p>
+        </p:txBody>
+      </p:sp>
+    </p:spTree>
+    <p:extLst>
+      <p:ext uri="{BB962C8B-B14F-4D97-AF65-F5344CB8AC3E}">
+        <p14:creationId xmlns:p14="http://schemas.microsoft.com/office/powerpoint/2010/main" val="782906587"/>
       </p:ext>
     </p:extLst>
   </p:cSld>

</xml_diff>

<commit_message>
Add tutorial to show how to create and NWB file with NWBZarrIO directly
</commit_message>
<xml_diff>
--- a/docs/source/figures/gallery_thumbnails.pptx
+++ b/docs/source/figures/gallery_thumbnails.pptx
@@ -5,12 +5,13 @@
     <p:sldMasterId id="2147483660" r:id="rId1"/>
   </p:sldMasterIdLst>
   <p:notesMasterIdLst>
-    <p:notesMasterId r:id="rId5"/>
+    <p:notesMasterId r:id="rId6"/>
   </p:notesMasterIdLst>
   <p:sldIdLst>
     <p:sldId id="345" r:id="rId2"/>
-    <p:sldId id="346" r:id="rId3"/>
-    <p:sldId id="357" r:id="rId4"/>
+    <p:sldId id="358" r:id="rId3"/>
+    <p:sldId id="346" r:id="rId4"/>
+    <p:sldId id="357" r:id="rId5"/>
   </p:sldIdLst>
   <p:sldSz cx="12192000" cy="6858000"/>
   <p:notesSz cx="6858000" cy="9144000"/>
@@ -210,7 +211,7 @@
           <a:p>
             <a:fld id="{4D6A40B9-902A-4E0E-AF39-1C357549AEE0}" type="datetimeFigureOut">
               <a:rPr lang="en-US" smtClean="0"/>
-              <a:t>4/15/22</a:t>
+              <a:t>12/14/22</a:t>
             </a:fld>
             <a:endParaRPr lang="en-US"/>
           </a:p>
@@ -3463,6 +3464,274 @@
 </file>
 
 <file path=ppt/slides/slide2.xml><?xml version="1.0" encoding="utf-8"?>
+<p:sld xmlns:a="http://schemas.openxmlformats.org/drawingml/2006/main" xmlns:r="http://schemas.openxmlformats.org/officeDocument/2006/relationships" xmlns:p="http://schemas.openxmlformats.org/presentationml/2006/main">
+  <p:cSld>
+    <p:spTree>
+      <p:nvGrpSpPr>
+        <p:cNvPr id="1" name=""/>
+        <p:cNvGrpSpPr/>
+        <p:nvPr/>
+      </p:nvGrpSpPr>
+      <p:grpSpPr>
+        <a:xfrm>
+          <a:off x="0" y="0"/>
+          <a:ext cx="0" cy="0"/>
+          <a:chOff x="0" y="0"/>
+          <a:chExt cx="0" cy="0"/>
+        </a:xfrm>
+      </p:grpSpPr>
+      <p:sp>
+        <p:nvSpPr>
+          <p:cNvPr id="7" name="Rounded Rectangle 6"/>
+          <p:cNvSpPr/>
+          <p:nvPr/>
+        </p:nvSpPr>
+        <p:spPr>
+          <a:xfrm>
+            <a:off x="853570" y="822438"/>
+            <a:ext cx="7234527" cy="4851352"/>
+          </a:xfrm>
+          <a:prstGeom prst="roundRect">
+            <a:avLst>
+              <a:gd name="adj" fmla="val 4437"/>
+            </a:avLst>
+          </a:prstGeom>
+          <a:solidFill>
+            <a:srgbClr val="EDEDED"/>
+          </a:solidFill>
+          <a:ln>
+            <a:solidFill>
+              <a:srgbClr val="000000"/>
+            </a:solidFill>
+          </a:ln>
+          <a:effectLst/>
+        </p:spPr>
+        <p:style>
+          <a:lnRef idx="1">
+            <a:schemeClr val="accent1"/>
+          </a:lnRef>
+          <a:fillRef idx="3">
+            <a:schemeClr val="accent1"/>
+          </a:fillRef>
+          <a:effectRef idx="2">
+            <a:schemeClr val="accent1"/>
+          </a:effectRef>
+          <a:fontRef idx="minor">
+            <a:schemeClr val="lt1"/>
+          </a:fontRef>
+        </p:style>
+        <p:txBody>
+          <a:bodyPr rtlCol="0" anchor="ctr"/>
+          <a:lstStyle/>
+          <a:p>
+            <a:pPr algn="ctr"/>
+            <a:endParaRPr lang="en-US"/>
+          </a:p>
+        </p:txBody>
+      </p:sp>
+      <p:sp>
+        <p:nvSpPr>
+          <p:cNvPr id="5" name="Rectangle 4"/>
+          <p:cNvSpPr/>
+          <p:nvPr/>
+        </p:nvSpPr>
+        <p:spPr>
+          <a:xfrm>
+            <a:off x="843162" y="823781"/>
+            <a:ext cx="7234526" cy="1754326"/>
+          </a:xfrm>
+          <a:prstGeom prst="rect">
+            <a:avLst/>
+          </a:prstGeom>
+        </p:spPr>
+        <p:txBody>
+          <a:bodyPr wrap="square">
+            <a:spAutoFit/>
+          </a:bodyPr>
+          <a:lstStyle/>
+          <a:p>
+            <a:pPr algn="ctr"/>
+            <a:r>
+              <a:rPr lang="en-US" sz="5400" b="1" dirty="0">
+                <a:solidFill>
+                  <a:srgbClr val="052B48"/>
+                </a:solidFill>
+                <a:latin typeface="Calibri"/>
+                <a:cs typeface="Calibri"/>
+              </a:rPr>
+              <a:t>Creating NWB files in </a:t>
+            </a:r>
+            <a:r>
+              <a:rPr lang="en-US" sz="5400" b="1" dirty="0" err="1">
+                <a:solidFill>
+                  <a:srgbClr val="052B48"/>
+                </a:solidFill>
+                <a:latin typeface="Calibri"/>
+                <a:cs typeface="Calibri"/>
+              </a:rPr>
+              <a:t>Zarr</a:t>
+            </a:r>
+            <a:endParaRPr lang="en-US" sz="5400" b="1" dirty="0">
+              <a:solidFill>
+                <a:srgbClr val="052B48"/>
+              </a:solidFill>
+              <a:latin typeface="Calibri"/>
+              <a:cs typeface="Calibri"/>
+            </a:endParaRPr>
+          </a:p>
+        </p:txBody>
+      </p:sp>
+      <p:pic>
+        <p:nvPicPr>
+          <p:cNvPr id="1026" name="Picture 2" descr="Logo">
+            <a:extLst>
+              <a:ext uri="{FF2B5EF4-FFF2-40B4-BE49-F238E27FC236}">
+                <a16:creationId xmlns:a16="http://schemas.microsoft.com/office/drawing/2014/main" id="{756978BE-4841-274F-8BDE-61B6B1DD8C3D}"/>
+              </a:ext>
+            </a:extLst>
+          </p:cNvPr>
+          <p:cNvPicPr>
+            <a:picLocks noChangeAspect="1" noChangeArrowheads="1"/>
+          </p:cNvPicPr>
+          <p:nvPr/>
+        </p:nvPicPr>
+        <p:blipFill>
+          <a:blip r:embed="rId2">
+            <a:extLst>
+              <a:ext uri="{28A0092B-C50C-407E-A947-70E740481C1C}">
+                <a14:useLocalDpi xmlns:a14="http://schemas.microsoft.com/office/drawing/2010/main" val="0"/>
+              </a:ext>
+            </a:extLst>
+          </a:blip>
+          <a:srcRect/>
+          <a:stretch>
+            <a:fillRect/>
+          </a:stretch>
+        </p:blipFill>
+        <p:spPr bwMode="auto">
+          <a:xfrm>
+            <a:off x="1050948" y="2654121"/>
+            <a:ext cx="2738810" cy="1927608"/>
+          </a:xfrm>
+          <a:prstGeom prst="rect">
+            <a:avLst/>
+          </a:prstGeom>
+          <a:noFill/>
+          <a:extLst>
+            <a:ext uri="{909E8E84-426E-40DD-AFC4-6F175D3DCCD1}">
+              <a14:hiddenFill xmlns:a14="http://schemas.microsoft.com/office/drawing/2010/main">
+                <a:solidFill>
+                  <a:srgbClr val="FFFFFF"/>
+                </a:solidFill>
+              </a14:hiddenFill>
+            </a:ext>
+          </a:extLst>
+        </p:spPr>
+      </p:pic>
+      <p:pic>
+        <p:nvPicPr>
+          <p:cNvPr id="2" name="Picture 6">
+            <a:extLst>
+              <a:ext uri="{FF2B5EF4-FFF2-40B4-BE49-F238E27FC236}">
+                <a16:creationId xmlns:a16="http://schemas.microsoft.com/office/drawing/2014/main" id="{2A64B990-6B52-1697-81BE-4E08A9916F58}"/>
+              </a:ext>
+            </a:extLst>
+          </p:cNvPr>
+          <p:cNvPicPr>
+            <a:picLocks noChangeAspect="1" noChangeArrowheads="1"/>
+          </p:cNvPicPr>
+          <p:nvPr/>
+        </p:nvPicPr>
+        <p:blipFill rotWithShape="1">
+          <a:blip r:embed="rId3">
+            <a:extLst>
+              <a:ext uri="{28A0092B-C50C-407E-A947-70E740481C1C}">
+                <a14:useLocalDpi xmlns:a14="http://schemas.microsoft.com/office/drawing/2010/main" val="0"/>
+              </a:ext>
+            </a:extLst>
+          </a:blip>
+          <a:srcRect l="6290" t="6894" r="6652" b="8824"/>
+          <a:stretch/>
+        </p:blipFill>
+        <p:spPr bwMode="auto">
+          <a:xfrm>
+            <a:off x="5051047" y="2947952"/>
+            <a:ext cx="2751638" cy="2663883"/>
+          </a:xfrm>
+          <a:prstGeom prst="rect">
+            <a:avLst/>
+          </a:prstGeom>
+          <a:noFill/>
+          <a:extLst>
+            <a:ext uri="{909E8E84-426E-40DD-AFC4-6F175D3DCCD1}">
+              <a14:hiddenFill xmlns:a14="http://schemas.microsoft.com/office/drawing/2010/main">
+                <a:solidFill>
+                  <a:srgbClr val="FFFFFF"/>
+                </a:solidFill>
+              </a14:hiddenFill>
+            </a:ext>
+          </a:extLst>
+        </p:spPr>
+      </p:pic>
+      <p:cxnSp>
+        <p:nvCxnSpPr>
+          <p:cNvPr id="4" name="Straight Arrow Connector 3">
+            <a:extLst>
+              <a:ext uri="{FF2B5EF4-FFF2-40B4-BE49-F238E27FC236}">
+                <a16:creationId xmlns:a16="http://schemas.microsoft.com/office/drawing/2014/main" id="{AB754F18-C3D1-6D8D-C4B3-57C0F47DA540}"/>
+              </a:ext>
+            </a:extLst>
+          </p:cNvPr>
+          <p:cNvCxnSpPr>
+            <a:stCxn id="1026" idx="3"/>
+            <a:endCxn id="2" idx="1"/>
+          </p:cNvCxnSpPr>
+          <p:nvPr/>
+        </p:nvCxnSpPr>
+        <p:spPr>
+          <a:xfrm>
+            <a:off x="3789758" y="3617925"/>
+            <a:ext cx="1261289" cy="661969"/>
+          </a:xfrm>
+          <a:prstGeom prst="straightConnector1">
+            <a:avLst/>
+          </a:prstGeom>
+          <a:ln w="76200">
+            <a:solidFill>
+              <a:srgbClr val="052A48"/>
+            </a:solidFill>
+            <a:tailEnd type="triangle"/>
+          </a:ln>
+        </p:spPr>
+        <p:style>
+          <a:lnRef idx="1">
+            <a:schemeClr val="accent1"/>
+          </a:lnRef>
+          <a:fillRef idx="0">
+            <a:schemeClr val="accent1"/>
+          </a:fillRef>
+          <a:effectRef idx="0">
+            <a:schemeClr val="accent1"/>
+          </a:effectRef>
+          <a:fontRef idx="minor">
+            <a:schemeClr val="tx1"/>
+          </a:fontRef>
+        </p:style>
+      </p:cxnSp>
+    </p:spTree>
+    <p:extLst>
+      <p:ext uri="{BB962C8B-B14F-4D97-AF65-F5344CB8AC3E}">
+        <p14:creationId xmlns:p14="http://schemas.microsoft.com/office/powerpoint/2010/main" val="1359954700"/>
+      </p:ext>
+    </p:extLst>
+  </p:cSld>
+  <p:clrMapOvr>
+    <a:masterClrMapping/>
+  </p:clrMapOvr>
+</p:sld>
+</file>
+
+<file path=ppt/slides/slide3.xml><?xml version="1.0" encoding="utf-8"?>
 <p:sld xmlns:a="http://schemas.openxmlformats.org/drawingml/2006/main" xmlns:r="http://schemas.openxmlformats.org/officeDocument/2006/relationships" xmlns:p="http://schemas.openxmlformats.org/presentationml/2006/main">
   <p:cSld>
     <p:spTree>
@@ -3792,7 +4061,7 @@
 </p:sld>
 </file>
 
-<file path=ppt/slides/slide3.xml><?xml version="1.0" encoding="utf-8"?>
+<file path=ppt/slides/slide4.xml><?xml version="1.0" encoding="utf-8"?>
 <p:sld xmlns:a="http://schemas.openxmlformats.org/drawingml/2006/main" xmlns:r="http://schemas.openxmlformats.org/officeDocument/2006/relationships" xmlns:p="http://schemas.openxmlformats.org/presentationml/2006/main">
   <p:cSld>
     <p:spTree>

</xml_diff>

<commit_message>
Debug the use of relative links (#46)
* Change zarr extension for NWB conversion
* Add external link support for sphinx
* Add tutorial to show how to create and NWB file with NWBZarrIO directly
* Make source path for links relative to the current Zarr file and add function to resolve relative paths on read
* Fix requirement definition in setup.py
* Update requirements-dev.txt
* Update run_tests.yml
* Update test.py
* Update tox.ini
* Updated ToDo and Limitations list in docs
Co-authored-by: mavaylon1 <mavaylon1@berkeley.edu>
</commit_message>
<xml_diff>
--- a/docs/source/figures/gallery_thumbnails.pptx
+++ b/docs/source/figures/gallery_thumbnails.pptx
@@ -5,12 +5,13 @@
     <p:sldMasterId id="2147483660" r:id="rId1"/>
   </p:sldMasterIdLst>
   <p:notesMasterIdLst>
-    <p:notesMasterId r:id="rId5"/>
+    <p:notesMasterId r:id="rId6"/>
   </p:notesMasterIdLst>
   <p:sldIdLst>
     <p:sldId id="345" r:id="rId2"/>
-    <p:sldId id="346" r:id="rId3"/>
-    <p:sldId id="357" r:id="rId4"/>
+    <p:sldId id="358" r:id="rId3"/>
+    <p:sldId id="346" r:id="rId4"/>
+    <p:sldId id="357" r:id="rId5"/>
   </p:sldIdLst>
   <p:sldSz cx="12192000" cy="6858000"/>
   <p:notesSz cx="6858000" cy="9144000"/>
@@ -210,7 +211,7 @@
           <a:p>
             <a:fld id="{4D6A40B9-902A-4E0E-AF39-1C357549AEE0}" type="datetimeFigureOut">
               <a:rPr lang="en-US" smtClean="0"/>
-              <a:t>4/15/22</a:t>
+              <a:t>12/14/22</a:t>
             </a:fld>
             <a:endParaRPr lang="en-US"/>
           </a:p>
@@ -3463,6 +3464,274 @@
 </file>
 
 <file path=ppt/slides/slide2.xml><?xml version="1.0" encoding="utf-8"?>
+<p:sld xmlns:a="http://schemas.openxmlformats.org/drawingml/2006/main" xmlns:r="http://schemas.openxmlformats.org/officeDocument/2006/relationships" xmlns:p="http://schemas.openxmlformats.org/presentationml/2006/main">
+  <p:cSld>
+    <p:spTree>
+      <p:nvGrpSpPr>
+        <p:cNvPr id="1" name=""/>
+        <p:cNvGrpSpPr/>
+        <p:nvPr/>
+      </p:nvGrpSpPr>
+      <p:grpSpPr>
+        <a:xfrm>
+          <a:off x="0" y="0"/>
+          <a:ext cx="0" cy="0"/>
+          <a:chOff x="0" y="0"/>
+          <a:chExt cx="0" cy="0"/>
+        </a:xfrm>
+      </p:grpSpPr>
+      <p:sp>
+        <p:nvSpPr>
+          <p:cNvPr id="7" name="Rounded Rectangle 6"/>
+          <p:cNvSpPr/>
+          <p:nvPr/>
+        </p:nvSpPr>
+        <p:spPr>
+          <a:xfrm>
+            <a:off x="853570" y="822438"/>
+            <a:ext cx="7234527" cy="4851352"/>
+          </a:xfrm>
+          <a:prstGeom prst="roundRect">
+            <a:avLst>
+              <a:gd name="adj" fmla="val 4437"/>
+            </a:avLst>
+          </a:prstGeom>
+          <a:solidFill>
+            <a:srgbClr val="EDEDED"/>
+          </a:solidFill>
+          <a:ln>
+            <a:solidFill>
+              <a:srgbClr val="000000"/>
+            </a:solidFill>
+          </a:ln>
+          <a:effectLst/>
+        </p:spPr>
+        <p:style>
+          <a:lnRef idx="1">
+            <a:schemeClr val="accent1"/>
+          </a:lnRef>
+          <a:fillRef idx="3">
+            <a:schemeClr val="accent1"/>
+          </a:fillRef>
+          <a:effectRef idx="2">
+            <a:schemeClr val="accent1"/>
+          </a:effectRef>
+          <a:fontRef idx="minor">
+            <a:schemeClr val="lt1"/>
+          </a:fontRef>
+        </p:style>
+        <p:txBody>
+          <a:bodyPr rtlCol="0" anchor="ctr"/>
+          <a:lstStyle/>
+          <a:p>
+            <a:pPr algn="ctr"/>
+            <a:endParaRPr lang="en-US"/>
+          </a:p>
+        </p:txBody>
+      </p:sp>
+      <p:sp>
+        <p:nvSpPr>
+          <p:cNvPr id="5" name="Rectangle 4"/>
+          <p:cNvSpPr/>
+          <p:nvPr/>
+        </p:nvSpPr>
+        <p:spPr>
+          <a:xfrm>
+            <a:off x="843162" y="823781"/>
+            <a:ext cx="7234526" cy="1754326"/>
+          </a:xfrm>
+          <a:prstGeom prst="rect">
+            <a:avLst/>
+          </a:prstGeom>
+        </p:spPr>
+        <p:txBody>
+          <a:bodyPr wrap="square">
+            <a:spAutoFit/>
+          </a:bodyPr>
+          <a:lstStyle/>
+          <a:p>
+            <a:pPr algn="ctr"/>
+            <a:r>
+              <a:rPr lang="en-US" sz="5400" b="1" dirty="0">
+                <a:solidFill>
+                  <a:srgbClr val="052B48"/>
+                </a:solidFill>
+                <a:latin typeface="Calibri"/>
+                <a:cs typeface="Calibri"/>
+              </a:rPr>
+              <a:t>Creating NWB files in </a:t>
+            </a:r>
+            <a:r>
+              <a:rPr lang="en-US" sz="5400" b="1" dirty="0" err="1">
+                <a:solidFill>
+                  <a:srgbClr val="052B48"/>
+                </a:solidFill>
+                <a:latin typeface="Calibri"/>
+                <a:cs typeface="Calibri"/>
+              </a:rPr>
+              <a:t>Zarr</a:t>
+            </a:r>
+            <a:endParaRPr lang="en-US" sz="5400" b="1" dirty="0">
+              <a:solidFill>
+                <a:srgbClr val="052B48"/>
+              </a:solidFill>
+              <a:latin typeface="Calibri"/>
+              <a:cs typeface="Calibri"/>
+            </a:endParaRPr>
+          </a:p>
+        </p:txBody>
+      </p:sp>
+      <p:pic>
+        <p:nvPicPr>
+          <p:cNvPr id="1026" name="Picture 2" descr="Logo">
+            <a:extLst>
+              <a:ext uri="{FF2B5EF4-FFF2-40B4-BE49-F238E27FC236}">
+                <a16:creationId xmlns:a16="http://schemas.microsoft.com/office/drawing/2014/main" id="{756978BE-4841-274F-8BDE-61B6B1DD8C3D}"/>
+              </a:ext>
+            </a:extLst>
+          </p:cNvPr>
+          <p:cNvPicPr>
+            <a:picLocks noChangeAspect="1" noChangeArrowheads="1"/>
+          </p:cNvPicPr>
+          <p:nvPr/>
+        </p:nvPicPr>
+        <p:blipFill>
+          <a:blip r:embed="rId2">
+            <a:extLst>
+              <a:ext uri="{28A0092B-C50C-407E-A947-70E740481C1C}">
+                <a14:useLocalDpi xmlns:a14="http://schemas.microsoft.com/office/drawing/2010/main" val="0"/>
+              </a:ext>
+            </a:extLst>
+          </a:blip>
+          <a:srcRect/>
+          <a:stretch>
+            <a:fillRect/>
+          </a:stretch>
+        </p:blipFill>
+        <p:spPr bwMode="auto">
+          <a:xfrm>
+            <a:off x="1050948" y="2654121"/>
+            <a:ext cx="2738810" cy="1927608"/>
+          </a:xfrm>
+          <a:prstGeom prst="rect">
+            <a:avLst/>
+          </a:prstGeom>
+          <a:noFill/>
+          <a:extLst>
+            <a:ext uri="{909E8E84-426E-40DD-AFC4-6F175D3DCCD1}">
+              <a14:hiddenFill xmlns:a14="http://schemas.microsoft.com/office/drawing/2010/main">
+                <a:solidFill>
+                  <a:srgbClr val="FFFFFF"/>
+                </a:solidFill>
+              </a14:hiddenFill>
+            </a:ext>
+          </a:extLst>
+        </p:spPr>
+      </p:pic>
+      <p:pic>
+        <p:nvPicPr>
+          <p:cNvPr id="2" name="Picture 6">
+            <a:extLst>
+              <a:ext uri="{FF2B5EF4-FFF2-40B4-BE49-F238E27FC236}">
+                <a16:creationId xmlns:a16="http://schemas.microsoft.com/office/drawing/2014/main" id="{2A64B990-6B52-1697-81BE-4E08A9916F58}"/>
+              </a:ext>
+            </a:extLst>
+          </p:cNvPr>
+          <p:cNvPicPr>
+            <a:picLocks noChangeAspect="1" noChangeArrowheads="1"/>
+          </p:cNvPicPr>
+          <p:nvPr/>
+        </p:nvPicPr>
+        <p:blipFill rotWithShape="1">
+          <a:blip r:embed="rId3">
+            <a:extLst>
+              <a:ext uri="{28A0092B-C50C-407E-A947-70E740481C1C}">
+                <a14:useLocalDpi xmlns:a14="http://schemas.microsoft.com/office/drawing/2010/main" val="0"/>
+              </a:ext>
+            </a:extLst>
+          </a:blip>
+          <a:srcRect l="6290" t="6894" r="6652" b="8824"/>
+          <a:stretch/>
+        </p:blipFill>
+        <p:spPr bwMode="auto">
+          <a:xfrm>
+            <a:off x="5051047" y="2947952"/>
+            <a:ext cx="2751638" cy="2663883"/>
+          </a:xfrm>
+          <a:prstGeom prst="rect">
+            <a:avLst/>
+          </a:prstGeom>
+          <a:noFill/>
+          <a:extLst>
+            <a:ext uri="{909E8E84-426E-40DD-AFC4-6F175D3DCCD1}">
+              <a14:hiddenFill xmlns:a14="http://schemas.microsoft.com/office/drawing/2010/main">
+                <a:solidFill>
+                  <a:srgbClr val="FFFFFF"/>
+                </a:solidFill>
+              </a14:hiddenFill>
+            </a:ext>
+          </a:extLst>
+        </p:spPr>
+      </p:pic>
+      <p:cxnSp>
+        <p:nvCxnSpPr>
+          <p:cNvPr id="4" name="Straight Arrow Connector 3">
+            <a:extLst>
+              <a:ext uri="{FF2B5EF4-FFF2-40B4-BE49-F238E27FC236}">
+                <a16:creationId xmlns:a16="http://schemas.microsoft.com/office/drawing/2014/main" id="{AB754F18-C3D1-6D8D-C4B3-57C0F47DA540}"/>
+              </a:ext>
+            </a:extLst>
+          </p:cNvPr>
+          <p:cNvCxnSpPr>
+            <a:stCxn id="1026" idx="3"/>
+            <a:endCxn id="2" idx="1"/>
+          </p:cNvCxnSpPr>
+          <p:nvPr/>
+        </p:nvCxnSpPr>
+        <p:spPr>
+          <a:xfrm>
+            <a:off x="3789758" y="3617925"/>
+            <a:ext cx="1261289" cy="661969"/>
+          </a:xfrm>
+          <a:prstGeom prst="straightConnector1">
+            <a:avLst/>
+          </a:prstGeom>
+          <a:ln w="76200">
+            <a:solidFill>
+              <a:srgbClr val="052A48"/>
+            </a:solidFill>
+            <a:tailEnd type="triangle"/>
+          </a:ln>
+        </p:spPr>
+        <p:style>
+          <a:lnRef idx="1">
+            <a:schemeClr val="accent1"/>
+          </a:lnRef>
+          <a:fillRef idx="0">
+            <a:schemeClr val="accent1"/>
+          </a:fillRef>
+          <a:effectRef idx="0">
+            <a:schemeClr val="accent1"/>
+          </a:effectRef>
+          <a:fontRef idx="minor">
+            <a:schemeClr val="tx1"/>
+          </a:fontRef>
+        </p:style>
+      </p:cxnSp>
+    </p:spTree>
+    <p:extLst>
+      <p:ext uri="{BB962C8B-B14F-4D97-AF65-F5344CB8AC3E}">
+        <p14:creationId xmlns:p14="http://schemas.microsoft.com/office/powerpoint/2010/main" val="1359954700"/>
+      </p:ext>
+    </p:extLst>
+  </p:cSld>
+  <p:clrMapOvr>
+    <a:masterClrMapping/>
+  </p:clrMapOvr>
+</p:sld>
+</file>
+
+<file path=ppt/slides/slide3.xml><?xml version="1.0" encoding="utf-8"?>
 <p:sld xmlns:a="http://schemas.openxmlformats.org/drawingml/2006/main" xmlns:r="http://schemas.openxmlformats.org/officeDocument/2006/relationships" xmlns:p="http://schemas.openxmlformats.org/presentationml/2006/main">
   <p:cSld>
     <p:spTree>
@@ -3792,7 +4061,7 @@
 </p:sld>
 </file>
 
-<file path=ppt/slides/slide3.xml><?xml version="1.0" encoding="utf-8"?>
+<file path=ppt/slides/slide4.xml><?xml version="1.0" encoding="utf-8"?>
 <p:sld xmlns:a="http://schemas.openxmlformats.org/drawingml/2006/main" xmlns:r="http://schemas.openxmlformats.org/officeDocument/2006/relationships" xmlns:p="http://schemas.openxmlformats.org/presentationml/2006/main">
   <p:cSld>
     <p:spTree>

</xml_diff>